<commit_message>
added day 2 sln
</commit_message>
<xml_diff>
--- a/w4d2/w4d2Presentation.pptx
+++ b/w4d2/w4d2Presentation.pptx
@@ -5,7 +5,7 @@
     <p:sldMasterId id="2147483671" r:id="rId1"/>
   </p:sldMasterIdLst>
   <p:notesMasterIdLst>
-    <p:notesMasterId r:id="rId9"/>
+    <p:notesMasterId r:id="rId10"/>
   </p:notesMasterIdLst>
   <p:sldIdLst>
     <p:sldId id="256" r:id="rId2"/>
@@ -15,16 +15,17 @@
     <p:sldId id="386" r:id="rId6"/>
     <p:sldId id="387" r:id="rId7"/>
     <p:sldId id="374" r:id="rId8"/>
+    <p:sldId id="388" r:id="rId9"/>
   </p:sldIdLst>
   <p:sldSz cx="9144000" cy="5143500" type="screen16x9"/>
   <p:notesSz cx="9144000" cy="5143500"/>
   <p:embeddedFontLst>
     <p:embeddedFont>
       <p:font typeface="Calibri" panose="020F0502020204030204" pitchFamily="34" charset="0"/>
-      <p:regular r:id="rId10"/>
-      <p:bold r:id="rId11"/>
-      <p:italic r:id="rId12"/>
-      <p:boldItalic r:id="rId13"/>
+      <p:regular r:id="rId11"/>
+      <p:bold r:id="rId12"/>
+      <p:italic r:id="rId13"/>
+      <p:boldItalic r:id="rId14"/>
     </p:embeddedFont>
   </p:embeddedFontLst>
   <p:defaultTextStyle>
@@ -23379,6 +23380,21 @@
               <a:rPr lang="en-US" sz="2000" dirty="0" err="1" smtClean="0"/>
               <a:t>Gorobievschi</a:t>
             </a:r>
+            <a:r>
+              <a:rPr lang="en-US" sz="2000" dirty="0" smtClean="0"/>
+              <a:t/>
+            </a:r>
+            <a:br>
+              <a:rPr lang="en-US" sz="2000" dirty="0" smtClean="0"/>
+            </a:br>
+            <a:r>
+              <a:rPr lang="en-US" sz="2000" dirty="0" err="1" smtClean="0"/>
+              <a:t>Motrescu</a:t>
+            </a:r>
+            <a:r>
+              <a:rPr lang="en-US" sz="2000" dirty="0" smtClean="0"/>
+              <a:t> Radu</a:t>
+            </a:r>
             <a:endParaRPr lang="en-US" sz="2000" b="1" i="0" u="none" strike="noStrike" cap="none" dirty="0">
               <a:solidFill>
                 <a:srgbClr val="FFFFFF"/>
@@ -24421,6 +24437,55 @@
       </p:par>
     </p:tnLst>
   </p:timing>
+</p:sld>
+</file>
+
+<file path=ppt/slides/slide8.xml><?xml version="1.0" encoding="utf-8"?>
+<p:sld xmlns:a="http://schemas.openxmlformats.org/drawingml/2006/main" xmlns:r="http://schemas.openxmlformats.org/officeDocument/2006/relationships" xmlns:p="http://schemas.openxmlformats.org/presentationml/2006/main">
+  <p:cSld>
+    <p:spTree>
+      <p:nvGrpSpPr>
+        <p:cNvPr id="1" name=""/>
+        <p:cNvGrpSpPr/>
+        <p:nvPr/>
+      </p:nvGrpSpPr>
+      <p:grpSpPr>
+        <a:xfrm>
+          <a:off x="0" y="0"/>
+          <a:ext cx="0" cy="0"/>
+          <a:chOff x="0" y="0"/>
+          <a:chExt cx="0" cy="0"/>
+        </a:xfrm>
+      </p:grpSpPr>
+      <p:sp>
+        <p:nvSpPr>
+          <p:cNvPr id="2" name="Title 1"/>
+          <p:cNvSpPr>
+            <a:spLocks noGrp="1"/>
+          </p:cNvSpPr>
+          <p:nvPr>
+            <p:ph type="title"/>
+          </p:nvPr>
+        </p:nvSpPr>
+        <p:spPr/>
+        <p:txBody>
+          <a:bodyPr/>
+          <a:lstStyle/>
+          <a:p>
+            <a:endParaRPr lang="en-US"/>
+          </a:p>
+        </p:txBody>
+      </p:sp>
+    </p:spTree>
+    <p:extLst>
+      <p:ext uri="{BB962C8B-B14F-4D97-AF65-F5344CB8AC3E}">
+        <p14:creationId xmlns:p14="http://schemas.microsoft.com/office/powerpoint/2010/main" val="1573624285"/>
+      </p:ext>
+    </p:extLst>
+  </p:cSld>
+  <p:clrMapOvr>
+    <a:masterClrMapping/>
+  </p:clrMapOvr>
 </p:sld>
 </file>
 

</xml_diff>